<commit_message>
feat: add new scripts
</commit_message>
<xml_diff>
--- a/orm/orm-01.pptx
+++ b/orm/orm-01.pptx
@@ -207,7 +207,7 @@
           <a:p>
             <a:fld id="{9B9ECB28-6A22-4037-9487-F3F739F744D6}" type="datetimeFigureOut">
               <a:rPr lang="en-US" smtClean="0"/>
-              <a:t>12/24/2021</a:t>
+              <a:t>12/25/2021</a:t>
             </a:fld>
             <a:endParaRPr lang="en-US"/>
           </a:p>
@@ -474,6 +474,132 @@
 </p:notesMaster>
 </file>
 
+<file path=ppt/notesSlides/notesSlide1.xml><?xml version="1.0" encoding="utf-8"?>
+<p:notes xmlns:a="http://schemas.openxmlformats.org/drawingml/2006/main" xmlns:r="http://schemas.openxmlformats.org/officeDocument/2006/relationships" xmlns:p="http://schemas.openxmlformats.org/presentationml/2006/main">
+  <p:cSld>
+    <p:spTree>
+      <p:nvGrpSpPr>
+        <p:cNvPr id="1" name=""/>
+        <p:cNvGrpSpPr/>
+        <p:nvPr/>
+      </p:nvGrpSpPr>
+      <p:grpSpPr>
+        <a:xfrm>
+          <a:off x="0" y="0"/>
+          <a:ext cx="0" cy="0"/>
+          <a:chOff x="0" y="0"/>
+          <a:chExt cx="0" cy="0"/>
+        </a:xfrm>
+      </p:grpSpPr>
+      <p:sp>
+        <p:nvSpPr>
+          <p:cNvPr id="2" name="Slide Image Placeholder 1"/>
+          <p:cNvSpPr>
+            <a:spLocks noGrp="1" noRot="1" noChangeAspect="1"/>
+          </p:cNvSpPr>
+          <p:nvPr>
+            <p:ph type="sldImg"/>
+          </p:nvPr>
+        </p:nvSpPr>
+        <p:spPr/>
+      </p:sp>
+      <p:sp>
+        <p:nvSpPr>
+          <p:cNvPr id="3" name="Notes Placeholder 2"/>
+          <p:cNvSpPr>
+            <a:spLocks noGrp="1"/>
+          </p:cNvSpPr>
+          <p:nvPr>
+            <p:ph type="body" idx="1"/>
+          </p:nvPr>
+        </p:nvSpPr>
+        <p:spPr/>
+        <p:txBody>
+          <a:bodyPr/>
+          <a:lstStyle/>
+          <a:p>
+            <a:r>
+              <a:rPr lang="en-US" dirty="0"/>
+              <a:t>Unique</a:t>
+            </a:r>
+          </a:p>
+          <a:p>
+            <a:r>
+              <a:rPr lang="en-US" dirty="0"/>
+              <a:t>Length</a:t>
+            </a:r>
+          </a:p>
+          <a:p>
+            <a:r>
+              <a:rPr lang="en-US" dirty="0"/>
+              <a:t>Type</a:t>
+            </a:r>
+          </a:p>
+          <a:p>
+            <a:r>
+              <a:rPr lang="en-US" dirty="0"/>
+              <a:t>Simple-array</a:t>
+            </a:r>
+          </a:p>
+          <a:p>
+            <a:r>
+              <a:rPr lang="en-US" dirty="0"/>
+              <a:t>Simple-json</a:t>
+            </a:r>
+          </a:p>
+          <a:p>
+            <a:r>
+              <a:rPr lang="en-US" dirty="0"/>
+              <a:t>Default</a:t>
+            </a:r>
+          </a:p>
+          <a:p>
+            <a:r>
+              <a:rPr lang="en-US" dirty="0"/>
+              <a:t>Name</a:t>
+            </a:r>
+          </a:p>
+          <a:p>
+            <a:endParaRPr lang="en-US" dirty="0"/>
+          </a:p>
+        </p:txBody>
+      </p:sp>
+      <p:sp>
+        <p:nvSpPr>
+          <p:cNvPr id="4" name="Slide Number Placeholder 3"/>
+          <p:cNvSpPr>
+            <a:spLocks noGrp="1"/>
+          </p:cNvSpPr>
+          <p:nvPr>
+            <p:ph type="sldNum" sz="quarter" idx="5"/>
+          </p:nvPr>
+        </p:nvSpPr>
+        <p:spPr/>
+        <p:txBody>
+          <a:bodyPr/>
+          <a:lstStyle/>
+          <a:p>
+            <a:fld id="{0FE84E6F-3671-472C-BE6F-A37BC298F4AB}" type="slidenum">
+              <a:rPr lang="en-US" smtClean="0"/>
+              <a:t>9</a:t>
+            </a:fld>
+            <a:endParaRPr lang="en-US"/>
+          </a:p>
+        </p:txBody>
+      </p:sp>
+    </p:spTree>
+    <p:extLst>
+      <p:ext uri="{BB962C8B-B14F-4D97-AF65-F5344CB8AC3E}">
+        <p14:creationId xmlns:p14="http://schemas.microsoft.com/office/powerpoint/2010/main" val="3454178315"/>
+      </p:ext>
+    </p:extLst>
+  </p:cSld>
+  <p:clrMapOvr>
+    <a:masterClrMapping/>
+  </p:clrMapOvr>
+</p:notes>
+</file>
+
 <file path=ppt/slideLayouts/slideLayout1.xml><?xml version="1.0" encoding="utf-8"?>
 <p:sldLayout xmlns:a="http://schemas.openxmlformats.org/drawingml/2006/main" xmlns:r="http://schemas.openxmlformats.org/officeDocument/2006/relationships" xmlns:p="http://schemas.openxmlformats.org/presentationml/2006/main" type="title" preserve="1">
   <p:cSld name="Title Slide">
@@ -658,7 +784,7 @@
           <a:p>
             <a:fld id="{19B6F524-99F3-4BEA-ACD7-976EF4D36657}" type="datetime1">
               <a:rPr lang="en-US" smtClean="0"/>
-              <a:t>12/24/2021</a:t>
+              <a:t>12/25/2021</a:t>
             </a:fld>
             <a:endParaRPr lang="en-US" dirty="0"/>
           </a:p>
@@ -967,7 +1093,7 @@
           <a:p>
             <a:fld id="{2145C3A9-05D9-428D-9788-A7F14838F6F9}" type="datetime1">
               <a:rPr lang="en-US" smtClean="0"/>
-              <a:t>12/24/2021</a:t>
+              <a:t>12/25/2021</a:t>
             </a:fld>
             <a:endParaRPr lang="en-US" dirty="0"/>
           </a:p>
@@ -1165,7 +1291,7 @@
           <a:p>
             <a:fld id="{82C701FB-B03E-4981-A9F8-99B474DD173A}" type="datetime1">
               <a:rPr lang="en-US" smtClean="0"/>
-              <a:t>12/24/2021</a:t>
+              <a:t>12/25/2021</a:t>
             </a:fld>
             <a:endParaRPr lang="en-US" dirty="0"/>
           </a:p>
@@ -1432,7 +1558,7 @@
           <a:p>
             <a:fld id="{7A7E8EF3-CBF7-4EB9-B6E5-3754574E3433}" type="datetime1">
               <a:rPr lang="en-US" smtClean="0"/>
-              <a:t>12/24/2021</a:t>
+              <a:t>12/25/2021</a:t>
             </a:fld>
             <a:endParaRPr lang="en-US" dirty="0"/>
           </a:p>
@@ -1872,7 +1998,7 @@
           <a:p>
             <a:fld id="{DA8A4A96-31AC-487C-9F15-1822D58542B7}" type="datetime1">
               <a:rPr lang="en-US" smtClean="0"/>
-              <a:t>12/24/2021</a:t>
+              <a:t>12/25/2021</a:t>
             </a:fld>
             <a:endParaRPr lang="en-US" dirty="0"/>
           </a:p>
@@ -2413,7 +2539,7 @@
           <a:p>
             <a:fld id="{FBBF9546-09C4-4F24-A284-5B81FF8659B4}" type="datetime1">
               <a:rPr lang="en-US" smtClean="0"/>
-              <a:t>12/24/2021</a:t>
+              <a:t>12/25/2021</a:t>
             </a:fld>
             <a:endParaRPr lang="en-US" dirty="0"/>
           </a:p>
@@ -3299,7 +3425,7 @@
           <a:p>
             <a:fld id="{5BF4405D-15A5-450B-B053-484859B9C8F7}" type="datetime1">
               <a:rPr lang="en-US" smtClean="0"/>
-              <a:t>12/24/2021</a:t>
+              <a:t>12/25/2021</a:t>
             </a:fld>
             <a:endParaRPr lang="en-US" dirty="0"/>
           </a:p>
@@ -3473,7 +3599,7 @@
           <a:p>
             <a:fld id="{E0366559-EC21-40C1-8A65-9A3B4EA78391}" type="datetime1">
               <a:rPr lang="en-US" smtClean="0"/>
-              <a:t>12/24/2021</a:t>
+              <a:t>12/25/2021</a:t>
             </a:fld>
             <a:endParaRPr lang="en-US" dirty="0"/>
           </a:p>
@@ -3661,7 +3787,7 @@
           <a:p>
             <a:fld id="{4F09CA92-695C-4FFA-8E37-4D2C288BCC04}" type="datetime1">
               <a:rPr lang="en-US" smtClean="0"/>
-              <a:t>12/24/2021</a:t>
+              <a:t>12/25/2021</a:t>
             </a:fld>
             <a:endParaRPr lang="en-US" dirty="0"/>
           </a:p>
@@ -3835,7 +3961,7 @@
           <a:p>
             <a:fld id="{CA551262-FC07-4FE4-9221-F72F7D4F209A}" type="datetime1">
               <a:rPr lang="en-US" smtClean="0"/>
-              <a:t>12/24/2021</a:t>
+              <a:t>12/25/2021</a:t>
             </a:fld>
             <a:endParaRPr lang="en-US" dirty="0"/>
           </a:p>
@@ -4083,7 +4209,7 @@
           <a:p>
             <a:fld id="{46A321E4-8899-4F7D-BEB1-BD52626ABD8D}" type="datetime1">
               <a:rPr lang="en-US" smtClean="0"/>
-              <a:t>12/24/2021</a:t>
+              <a:t>12/25/2021</a:t>
             </a:fld>
             <a:endParaRPr lang="en-US" dirty="0"/>
           </a:p>
@@ -4329,7 +4455,7 @@
           <a:p>
             <a:fld id="{B53F6DFA-8A0E-4513-867D-18B9AA66B23C}" type="datetime1">
               <a:rPr lang="en-US" smtClean="0"/>
-              <a:t>12/24/2021</a:t>
+              <a:t>12/25/2021</a:t>
             </a:fld>
             <a:endParaRPr lang="en-US" dirty="0"/>
           </a:p>
@@ -4816,7 +4942,7 @@
           <a:p>
             <a:fld id="{154283A7-B9AC-454B-A468-44B75A398B49}" type="datetime1">
               <a:rPr lang="en-US" smtClean="0"/>
-              <a:t>12/24/2021</a:t>
+              <a:t>12/25/2021</a:t>
             </a:fld>
             <a:endParaRPr lang="en-US" dirty="0"/>
           </a:p>
@@ -4938,7 +5064,7 @@
           <a:p>
             <a:fld id="{A3F8184D-DEDD-48A0-9ACA-5F6ED9EFE5B8}" type="datetime1">
               <a:rPr lang="en-US" smtClean="0"/>
-              <a:t>12/24/2021</a:t>
+              <a:t>12/25/2021</a:t>
             </a:fld>
             <a:endParaRPr lang="en-US" dirty="0"/>
           </a:p>
@@ -5037,7 +5163,7 @@
           <a:p>
             <a:fld id="{BF38AC0E-F520-48F3-BA14-8BAB82D735FB}" type="datetime1">
               <a:rPr lang="en-US" smtClean="0"/>
-              <a:t>12/24/2021</a:t>
+              <a:t>12/25/2021</a:t>
             </a:fld>
             <a:endParaRPr lang="en-US" dirty="0"/>
           </a:p>
@@ -5296,7 +5422,7 @@
           <a:p>
             <a:fld id="{317D0F2A-2724-4AD4-BF4C-A7B1910D9412}" type="datetime1">
               <a:rPr lang="en-US" smtClean="0"/>
-              <a:t>12/24/2021</a:t>
+              <a:t>12/25/2021</a:t>
             </a:fld>
             <a:endParaRPr lang="en-US" dirty="0"/>
           </a:p>
@@ -5607,7 +5733,7 @@
           <a:p>
             <a:fld id="{9A0B82A5-4A21-4F82-91DB-989CE997E82E}" type="datetime1">
               <a:rPr lang="en-US" smtClean="0"/>
-              <a:t>12/24/2021</a:t>
+              <a:t>12/25/2021</a:t>
             </a:fld>
             <a:endParaRPr lang="en-US" dirty="0"/>
           </a:p>
@@ -5844,7 +5970,7 @@
           <a:p>
             <a:fld id="{01BFEF8A-AE08-4951-B923-589F814B0C31}" type="datetime1">
               <a:rPr lang="en-US" smtClean="0"/>
-              <a:t>12/24/2021</a:t>
+              <a:t>12/25/2021</a:t>
             </a:fld>
             <a:endParaRPr lang="en-US" dirty="0"/>
           </a:p>
@@ -8202,6 +8328,14 @@
               <a:rPr lang="en-US" dirty="0" err="1"/>
               <a:t>typeorm</a:t>
             </a:r>
+            <a:r>
+              <a:rPr lang="en-US" dirty="0"/>
+              <a:t> </a:t>
+            </a:r>
+            <a:r>
+              <a:rPr lang="en-US" dirty="0" err="1"/>
+              <a:t>mssql</a:t>
+            </a:r>
             <a:endParaRPr lang="en-US" dirty="0"/>
           </a:p>
           <a:p>
@@ -8246,7 +8380,7 @@
             </a:r>
             <a:r>
               <a:rPr lang="en-US" dirty="0"/>
-              <a:t>’ --exec  ‘</a:t>
+              <a:t>’ --exec  </a:t>
             </a:r>
             <a:r>
               <a:rPr lang="en-US" dirty="0" err="1"/>
@@ -8254,7 +8388,7 @@
             </a:r>
             <a:r>
               <a:rPr lang="en-US" dirty="0"/>
-              <a:t>-node’ </a:t>
+              <a:t>-node </a:t>
             </a:r>
             <a:r>
               <a:rPr lang="en-US" dirty="0" err="1"/>

</xml_diff>